<commit_message>
finished the last presentation
</commit_message>
<xml_diff>
--- a/EverydayPython/EverydayPython.pptx
+++ b/EverydayPython/EverydayPython.pptx
@@ -5,7 +5,7 @@
     <p:sldMasterId id="2147483648" r:id="rId1"/>
   </p:sldMasterIdLst>
   <p:notesMasterIdLst>
-    <p:notesMasterId r:id="rId21"/>
+    <p:notesMasterId r:id="rId25"/>
   </p:notesMasterIdLst>
   <p:sldIdLst>
     <p:sldId id="256" r:id="rId4"/>
@@ -25,6 +25,10 @@
     <p:sldId id="270" r:id="rId18"/>
     <p:sldId id="271" r:id="rId19"/>
     <p:sldId id="272" r:id="rId20"/>
+    <p:sldId id="273" r:id="rId21"/>
+    <p:sldId id="274" r:id="rId22"/>
+    <p:sldId id="275" r:id="rId23"/>
+    <p:sldId id="276" r:id="rId24"/>
   </p:sldIdLst>
   <p:sldSz cx="12192000" cy="6858000"/>
   <p:notesSz cx="6858000" cy="9144000"/>
@@ -1151,7 +1155,7 @@
             <a:pPr>
               <a:defRPr/>
             </a:pPr>
-            <a:fld id="{9EEF7773-C797-AA8E-97E3-CEFDF2643DAF}" type="slidenum">
+            <a:fld id="{141764D9-20F4-5C00-849F-CF67BB7A5C2C}" type="slidenum">
               <a:rPr/>
               <a:t/>
             </a:fld>
@@ -1233,7 +1237,171 @@
             <a:pPr>
               <a:defRPr/>
             </a:pPr>
-            <a:fld id="{880CEE55-7315-9158-1B7D-DECAE3BF6F9F}" type="slidenum">
+            <a:fld id="{34466C8E-A953-6D7E-C109-6B59C6386404}" type="slidenum">
+              <a:rPr/>
+              <a:t/>
+            </a:fld>
+            <a:endParaRPr/>
+          </a:p>
+        </p:txBody>
+      </p:sp>
+    </p:spTree>
+  </p:cSld>
+</p:notes>
+</file>
+
+<file path=ppt/notesSlides/notesSlide18.xml><?xml version="1.0" encoding="utf-8"?>
+<p:notes xmlns:a="http://schemas.openxmlformats.org/drawingml/2006/main" xmlns:r="http://schemas.openxmlformats.org/officeDocument/2006/relationships" xmlns:p="http://schemas.openxmlformats.org/presentationml/2006/main" xmlns:m="http://schemas.openxmlformats.org/officeDocument/2006/math" xmlns:w="http://schemas.openxmlformats.org/wordprocessingml/2006/main">
+  <p:cSld name="">
+    <p:spTree>
+      <p:nvGrpSpPr>
+        <p:cNvPr id="1" name=""/>
+        <p:cNvGrpSpPr/>
+        <p:nvPr/>
+      </p:nvGrpSpPr>
+      <p:grpSpPr bwMode="auto">
+        <a:xfrm>
+          <a:off x="0" y="0"/>
+          <a:ext cx="0" cy="0"/>
+          <a:chOff x="0" y="0"/>
+          <a:chExt cx="0" cy="0"/>
+        </a:xfrm>
+      </p:grpSpPr>
+      <p:sp>
+        <p:nvSpPr>
+          <p:cNvPr id="2" name="Slide Image Placeholder 1"/>
+          <p:cNvSpPr>
+            <a:spLocks noChangeAspect="1" noGrp="1" noRot="1"/>
+          </p:cNvSpPr>
+          <p:nvPr>
+            <p:ph type="sldImg"/>
+          </p:nvPr>
+        </p:nvSpPr>
+        <p:spPr bwMode="auto"/>
+      </p:sp>
+      <p:sp>
+        <p:nvSpPr>
+          <p:cNvPr id="3" name="Notes Placeholder 2"/>
+          <p:cNvSpPr>
+            <a:spLocks noGrp="1"/>
+          </p:cNvSpPr>
+          <p:nvPr>
+            <p:ph type="body" idx="1"/>
+          </p:nvPr>
+        </p:nvSpPr>
+        <p:spPr bwMode="auto"/>
+        <p:txBody>
+          <a:bodyPr/>
+          <a:lstStyle/>
+          <a:p>
+            <a:pPr>
+              <a:defRPr/>
+            </a:pPr>
+            <a:endParaRPr/>
+          </a:p>
+        </p:txBody>
+      </p:sp>
+      <p:sp>
+        <p:nvSpPr>
+          <p:cNvPr id="4" name="Slide Number Placeholder 3"/>
+          <p:cNvSpPr>
+            <a:spLocks noGrp="1"/>
+          </p:cNvSpPr>
+          <p:nvPr>
+            <p:ph type="sldNum" sz="quarter" idx="10"/>
+          </p:nvPr>
+        </p:nvSpPr>
+        <p:spPr bwMode="auto"/>
+        <p:txBody>
+          <a:bodyPr/>
+          <a:lstStyle/>
+          <a:p>
+            <a:pPr>
+              <a:defRPr/>
+            </a:pPr>
+            <a:fld id="{0BD8D119-66DD-007A-A161-9D3013B27D81}" type="slidenum">
+              <a:rPr/>
+              <a:t/>
+            </a:fld>
+            <a:endParaRPr/>
+          </a:p>
+        </p:txBody>
+      </p:sp>
+    </p:spTree>
+  </p:cSld>
+</p:notes>
+</file>
+
+<file path=ppt/notesSlides/notesSlide19.xml><?xml version="1.0" encoding="utf-8"?>
+<p:notes xmlns:a="http://schemas.openxmlformats.org/drawingml/2006/main" xmlns:r="http://schemas.openxmlformats.org/officeDocument/2006/relationships" xmlns:p="http://schemas.openxmlformats.org/presentationml/2006/main" xmlns:m="http://schemas.openxmlformats.org/officeDocument/2006/math" xmlns:w="http://schemas.openxmlformats.org/wordprocessingml/2006/main">
+  <p:cSld name="">
+    <p:spTree>
+      <p:nvGrpSpPr>
+        <p:cNvPr id="1" name=""/>
+        <p:cNvGrpSpPr/>
+        <p:nvPr/>
+      </p:nvGrpSpPr>
+      <p:grpSpPr bwMode="auto">
+        <a:xfrm>
+          <a:off x="0" y="0"/>
+          <a:ext cx="0" cy="0"/>
+          <a:chOff x="0" y="0"/>
+          <a:chExt cx="0" cy="0"/>
+        </a:xfrm>
+      </p:grpSpPr>
+      <p:sp>
+        <p:nvSpPr>
+          <p:cNvPr id="2" name="Slide Image Placeholder 1"/>
+          <p:cNvSpPr>
+            <a:spLocks noChangeAspect="1" noGrp="1" noRot="1"/>
+          </p:cNvSpPr>
+          <p:nvPr>
+            <p:ph type="sldImg"/>
+          </p:nvPr>
+        </p:nvSpPr>
+        <p:spPr bwMode="auto"/>
+      </p:sp>
+      <p:sp>
+        <p:nvSpPr>
+          <p:cNvPr id="3" name="Notes Placeholder 2"/>
+          <p:cNvSpPr>
+            <a:spLocks noGrp="1"/>
+          </p:cNvSpPr>
+          <p:nvPr>
+            <p:ph type="body" idx="1"/>
+          </p:nvPr>
+        </p:nvSpPr>
+        <p:spPr bwMode="auto"/>
+        <p:txBody>
+          <a:bodyPr/>
+          <a:lstStyle/>
+          <a:p>
+            <a:pPr>
+              <a:defRPr/>
+            </a:pPr>
+            <a:endParaRPr/>
+          </a:p>
+        </p:txBody>
+      </p:sp>
+      <p:sp>
+        <p:nvSpPr>
+          <p:cNvPr id="4" name="Slide Number Placeholder 3"/>
+          <p:cNvSpPr>
+            <a:spLocks noGrp="1"/>
+          </p:cNvSpPr>
+          <p:nvPr>
+            <p:ph type="sldNum" sz="quarter" idx="10"/>
+          </p:nvPr>
+        </p:nvSpPr>
+        <p:spPr bwMode="auto"/>
+        <p:txBody>
+          <a:bodyPr/>
+          <a:lstStyle/>
+          <a:p>
+            <a:pPr>
+              <a:defRPr/>
+            </a:pPr>
+            <a:fld id="{6A9FFDCE-24AB-3C31-33AE-660BFB789B6F}" type="slidenum">
               <a:rPr/>
               <a:t/>
             </a:fld>
@@ -1316,6 +1484,170 @@
               <a:defRPr/>
             </a:pPr>
             <a:fld id="{670674FC-3019-1F51-2F73-336DEE69DF9A}" type="slidenum">
+              <a:rPr/>
+              <a:t/>
+            </a:fld>
+            <a:endParaRPr/>
+          </a:p>
+        </p:txBody>
+      </p:sp>
+    </p:spTree>
+  </p:cSld>
+</p:notes>
+</file>
+
+<file path=ppt/notesSlides/notesSlide20.xml><?xml version="1.0" encoding="utf-8"?>
+<p:notes xmlns:a="http://schemas.openxmlformats.org/drawingml/2006/main" xmlns:r="http://schemas.openxmlformats.org/officeDocument/2006/relationships" xmlns:p="http://schemas.openxmlformats.org/presentationml/2006/main" xmlns:m="http://schemas.openxmlformats.org/officeDocument/2006/math" xmlns:w="http://schemas.openxmlformats.org/wordprocessingml/2006/main">
+  <p:cSld name="">
+    <p:spTree>
+      <p:nvGrpSpPr>
+        <p:cNvPr id="1" name=""/>
+        <p:cNvGrpSpPr/>
+        <p:nvPr/>
+      </p:nvGrpSpPr>
+      <p:grpSpPr bwMode="auto">
+        <a:xfrm>
+          <a:off x="0" y="0"/>
+          <a:ext cx="0" cy="0"/>
+          <a:chOff x="0" y="0"/>
+          <a:chExt cx="0" cy="0"/>
+        </a:xfrm>
+      </p:grpSpPr>
+      <p:sp>
+        <p:nvSpPr>
+          <p:cNvPr id="2" name="Slide Image Placeholder 1"/>
+          <p:cNvSpPr>
+            <a:spLocks noChangeAspect="1" noGrp="1" noRot="1"/>
+          </p:cNvSpPr>
+          <p:nvPr>
+            <p:ph type="sldImg"/>
+          </p:nvPr>
+        </p:nvSpPr>
+        <p:spPr bwMode="auto"/>
+      </p:sp>
+      <p:sp>
+        <p:nvSpPr>
+          <p:cNvPr id="3" name="Notes Placeholder 2"/>
+          <p:cNvSpPr>
+            <a:spLocks noGrp="1"/>
+          </p:cNvSpPr>
+          <p:nvPr>
+            <p:ph type="body" idx="1"/>
+          </p:nvPr>
+        </p:nvSpPr>
+        <p:spPr bwMode="auto"/>
+        <p:txBody>
+          <a:bodyPr/>
+          <a:lstStyle/>
+          <a:p>
+            <a:pPr>
+              <a:defRPr/>
+            </a:pPr>
+            <a:endParaRPr/>
+          </a:p>
+        </p:txBody>
+      </p:sp>
+      <p:sp>
+        <p:nvSpPr>
+          <p:cNvPr id="4" name="Slide Number Placeholder 3"/>
+          <p:cNvSpPr>
+            <a:spLocks noGrp="1"/>
+          </p:cNvSpPr>
+          <p:nvPr>
+            <p:ph type="sldNum" sz="quarter" idx="10"/>
+          </p:nvPr>
+        </p:nvSpPr>
+        <p:spPr bwMode="auto"/>
+        <p:txBody>
+          <a:bodyPr/>
+          <a:lstStyle/>
+          <a:p>
+            <a:pPr>
+              <a:defRPr/>
+            </a:pPr>
+            <a:fld id="{6615AE12-06F0-D0B7-8459-DC334B4CA78C}" type="slidenum">
+              <a:rPr/>
+              <a:t/>
+            </a:fld>
+            <a:endParaRPr/>
+          </a:p>
+        </p:txBody>
+      </p:sp>
+    </p:spTree>
+  </p:cSld>
+</p:notes>
+</file>
+
+<file path=ppt/notesSlides/notesSlide21.xml><?xml version="1.0" encoding="utf-8"?>
+<p:notes xmlns:a="http://schemas.openxmlformats.org/drawingml/2006/main" xmlns:r="http://schemas.openxmlformats.org/officeDocument/2006/relationships" xmlns:p="http://schemas.openxmlformats.org/presentationml/2006/main" xmlns:m="http://schemas.openxmlformats.org/officeDocument/2006/math" xmlns:w="http://schemas.openxmlformats.org/wordprocessingml/2006/main">
+  <p:cSld name="">
+    <p:spTree>
+      <p:nvGrpSpPr>
+        <p:cNvPr id="1" name=""/>
+        <p:cNvGrpSpPr/>
+        <p:nvPr/>
+      </p:nvGrpSpPr>
+      <p:grpSpPr bwMode="auto">
+        <a:xfrm>
+          <a:off x="0" y="0"/>
+          <a:ext cx="0" cy="0"/>
+          <a:chOff x="0" y="0"/>
+          <a:chExt cx="0" cy="0"/>
+        </a:xfrm>
+      </p:grpSpPr>
+      <p:sp>
+        <p:nvSpPr>
+          <p:cNvPr id="2" name="Slide Image Placeholder 1"/>
+          <p:cNvSpPr>
+            <a:spLocks noChangeAspect="1" noGrp="1" noRot="1"/>
+          </p:cNvSpPr>
+          <p:nvPr>
+            <p:ph type="sldImg"/>
+          </p:nvPr>
+        </p:nvSpPr>
+        <p:spPr bwMode="auto"/>
+      </p:sp>
+      <p:sp>
+        <p:nvSpPr>
+          <p:cNvPr id="3" name="Notes Placeholder 2"/>
+          <p:cNvSpPr>
+            <a:spLocks noGrp="1"/>
+          </p:cNvSpPr>
+          <p:nvPr>
+            <p:ph type="body" idx="1"/>
+          </p:nvPr>
+        </p:nvSpPr>
+        <p:spPr bwMode="auto"/>
+        <p:txBody>
+          <a:bodyPr/>
+          <a:lstStyle/>
+          <a:p>
+            <a:pPr>
+              <a:defRPr/>
+            </a:pPr>
+            <a:endParaRPr/>
+          </a:p>
+        </p:txBody>
+      </p:sp>
+      <p:sp>
+        <p:nvSpPr>
+          <p:cNvPr id="4" name="Slide Number Placeholder 3"/>
+          <p:cNvSpPr>
+            <a:spLocks noGrp="1"/>
+          </p:cNvSpPr>
+          <p:nvPr>
+            <p:ph type="sldNum" sz="quarter" idx="10"/>
+          </p:nvPr>
+        </p:nvSpPr>
+        <p:spPr bwMode="auto"/>
+        <p:txBody>
+          <a:bodyPr/>
+          <a:lstStyle/>
+          <a:p>
+            <a:pPr>
+              <a:defRPr/>
+            </a:pPr>
+            <a:fld id="{880CEE55-7315-9158-1B7D-DECAE3BF6F9F}" type="slidenum">
               <a:rPr/>
               <a:t/>
             </a:fld>
@@ -8801,6 +9133,63 @@
               </a:rPr>
               <a:t>import matplotlib.pyplot as plt</a:t>
             </a:r>
+            <a:endParaRPr>
+              <a:latin typeface="Nimbus Mono PS"/>
+              <a:ea typeface="Nimbus Mono PS"/>
+              <a:cs typeface="Nimbus Mono PS"/>
+            </a:endParaRPr>
+          </a:p>
+          <a:p>
+            <a:pPr>
+              <a:defRPr/>
+            </a:pPr>
+            <a:r>
+              <a:rPr>
+                <a:latin typeface="Nimbus Mono PS"/>
+                <a:ea typeface="Nimbus Mono PS"/>
+                <a:cs typeface="Nimbus Mono PS"/>
+              </a:rPr>
+              <a:t>Matplotlib </a:t>
+            </a:r>
+            <a:r>
+              <a:rPr lang="pl-PL" sz="3200" b="0" i="0" u="none" strike="noStrike" cap="none" spc="0">
+                <a:solidFill>
+                  <a:schemeClr val="accent6">
+                    <a:lumMod val="50000"/>
+                  </a:schemeClr>
+                </a:solidFill>
+                <a:latin typeface="+mn-lt"/>
+                <a:ea typeface="+mn-ea"/>
+                <a:cs typeface="+mn-cs"/>
+              </a:rPr>
+              <a:t>to biblioteka kodu, zaś </a:t>
+            </a:r>
+            <a:r>
+              <a:rPr lang="pl-PL" sz="3200" b="0" i="0" u="none" strike="noStrike" cap="none" spc="0">
+                <a:solidFill>
+                  <a:schemeClr val="accent6">
+                    <a:lumMod val="50000"/>
+                  </a:schemeClr>
+                </a:solidFill>
+                <a:latin typeface="Nimbus Mono PS"/>
+                <a:ea typeface="Nimbus Mono PS"/>
+                <a:cs typeface="Nimbus Mono PS"/>
+              </a:rPr>
+              <a:t>pyplot </a:t>
+            </a:r>
+            <a:r>
+              <a:rPr lang="pl-PL" sz="3200" b="0" i="0" u="none" strike="noStrike" cap="none" spc="0">
+                <a:solidFill>
+                  <a:schemeClr val="accent6">
+                    <a:lumMod val="50000"/>
+                  </a:schemeClr>
+                </a:solidFill>
+                <a:latin typeface="Arial"/>
+                <a:ea typeface="Arial"/>
+                <a:cs typeface="Arial"/>
+              </a:rPr>
+              <a:t>stanowi interfejs, który zachowuje stan między wywołaniami</a:t>
+            </a:r>
             <a:endParaRPr/>
           </a:p>
           <a:p>
@@ -8888,7 +9277,7 @@
         </p:spPr>
         <p:txBody>
           <a:bodyPr vertOverflow="overflow" horzOverflow="overflow" vert="horz" wrap="square" lIns="91440" tIns="45720" rIns="91440" bIns="45720" numCol="1" spcCol="0" rtlCol="0" fromWordArt="0" anchor="t" anchorCtr="0" forceAA="0" upright="0" compatLnSpc="0">
-            <a:normAutofit/>
+            <a:normAutofit fontScale="85000" lnSpcReduction="3000"/>
           </a:bodyPr>
           <a:lstStyle/>
           <a:p>
@@ -8905,7 +9294,7 @@
             </a:r>
             <a:r>
               <a:rPr/>
-              <a:t> – tworzy wykres liniowy (w pamięci)</a:t>
+              <a:t> – tworzy wykres liniowy, x i y to tablice wartości</a:t>
             </a:r>
             <a:endParaRPr/>
           </a:p>
@@ -9027,8 +9416,41 @@
             </a:r>
             <a:r>
               <a:rPr/>
-              <a:t> – wartośći na osiach</a:t>
-            </a:r>
+              <a:t> – wartośći na osiach. </a:t>
+            </a:r>
+            <a:r>
+              <a:rPr lang="pl-PL" sz="3200" b="0" i="0" u="none" strike="noStrike" cap="none" spc="0">
+                <a:solidFill>
+                  <a:schemeClr val="accent6">
+                    <a:lumMod val="50000"/>
+                  </a:schemeClr>
+                </a:solidFill>
+                <a:latin typeface="Nimbus Mono PS"/>
+                <a:ea typeface="Nimbus Mono PS"/>
+                <a:cs typeface="Nimbus Mono PS"/>
+              </a:rPr>
+              <a:t>arr </a:t>
+            </a:r>
+            <a:r>
+              <a:rPr/>
+              <a:t>to tablica: </a:t>
+            </a:r>
+            <a:r>
+              <a:rPr lang="pl-PL" sz="3200" b="0" i="0" u="none" strike="noStrike" cap="none" spc="0">
+                <a:solidFill>
+                  <a:schemeClr val="accent6">
+                    <a:lumMod val="50000"/>
+                  </a:schemeClr>
+                </a:solidFill>
+                <a:latin typeface="Nimbus Mono PS"/>
+                <a:ea typeface="Nimbus Mono PS"/>
+                <a:cs typeface="Nimbus Mono PS"/>
+              </a:rPr>
+              <a:t>[xmin,xmax,ymin,ymax]</a:t>
+            </a:r>
+            <a:br>
+              <a:rPr/>
+            </a:br>
             <a:endParaRPr/>
           </a:p>
         </p:txBody>
@@ -9068,7 +9490,7 @@
       </p:grpSpPr>
       <p:sp>
         <p:nvSpPr>
-          <p:cNvPr id="1518862084" name="Заголовок 1"/>
+          <p:cNvPr id="427213007" name="Заголовок 1"/>
           <p:cNvSpPr>
             <a:spLocks noGrp="1"/>
           </p:cNvSpPr>
@@ -9086,15 +9508,15 @@
             </a:pPr>
             <a:r>
               <a:rPr/>
-              <a:t>Odczytywanie zawartości katalogu</a:t>
-            </a:r>
-            <a:endParaRPr/>
-          </a:p>
-        </p:txBody>
-      </p:sp>
-      <p:sp>
-        <p:nvSpPr>
-          <p:cNvPr id="1492158509" name="Объект 2"/>
+              <a:t>Pyplot</a:t>
+            </a:r>
+            <a:endParaRPr/>
+          </a:p>
+        </p:txBody>
+      </p:sp>
+      <p:sp>
+        <p:nvSpPr>
+          <p:cNvPr id="2133233860" name="Объект 2"/>
           <p:cNvSpPr>
             <a:spLocks noGrp="1"/>
           </p:cNvSpPr>
@@ -9110,6 +9532,40 @@
             <a:pPr>
               <a:defRPr/>
             </a:pPr>
+            <a:r>
+              <a:rPr/>
+              <a:t>W tym przykładzie korzystamy z interfejsu Pyplot.</a:t>
+            </a:r>
+            <a:endParaRPr/>
+          </a:p>
+          <a:p>
+            <a:pPr>
+              <a:defRPr/>
+            </a:pPr>
+            <a:r>
+              <a:rPr/>
+              <a:t>Istnieją inne, np. Pylab</a:t>
+            </a:r>
+            <a:endParaRPr/>
+          </a:p>
+          <a:p>
+            <a:pPr>
+              <a:defRPr/>
+            </a:pPr>
+            <a:r>
+              <a:rPr/>
+              <a:t>Można używać „samego” Matplotlib, ale Pyplot ułatwia nam życie</a:t>
+            </a:r>
+            <a:endParaRPr/>
+          </a:p>
+          <a:p>
+            <a:pPr>
+              <a:defRPr/>
+            </a:pPr>
+            <a:r>
+              <a:rPr/>
+              <a:t>Sam Matplotlib może się przydać, jeśli wykres ma stanowić element większej aplikacji</a:t>
+            </a:r>
             <a:endParaRPr/>
           </a:p>
         </p:txBody>
@@ -9149,7 +9605,7 @@
       </p:grpSpPr>
       <p:sp>
         <p:nvSpPr>
-          <p:cNvPr id="1432733166" name="Заголовок 1"/>
+          <p:cNvPr id="877899744" name="Заголовок 1"/>
           <p:cNvSpPr>
             <a:spLocks noGrp="1"/>
           </p:cNvSpPr>
@@ -9167,15 +9623,15 @@
             </a:pPr>
             <a:r>
               <a:rPr/>
-              <a:t>Źródła</a:t>
-            </a:r>
-            <a:endParaRPr/>
-          </a:p>
-        </p:txBody>
-      </p:sp>
-      <p:sp>
-        <p:nvSpPr>
-          <p:cNvPr id="1720179705" name="Объект 2"/>
+              <a:t>Pyplot</a:t>
+            </a:r>
+            <a:endParaRPr/>
+          </a:p>
+        </p:txBody>
+      </p:sp>
+      <p:sp>
+        <p:nvSpPr>
+          <p:cNvPr id="945739772" name="Объект 2"/>
           <p:cNvSpPr>
             <a:spLocks noGrp="1"/>
           </p:cNvSpPr>
@@ -9185,207 +9641,396 @@
         </p:nvSpPr>
         <p:spPr bwMode="auto"/>
         <p:txBody>
-          <a:bodyPr vertOverflow="overflow" horzOverflow="overflow" vert="horz" wrap="square" lIns="91440" tIns="45720" rIns="91440" bIns="45720" numCol="1" spcCol="0" rtlCol="0" fromWordArt="0" anchor="t" anchorCtr="0" forceAA="0" upright="0" compatLnSpc="0">
-            <a:normAutofit fontScale="90000" lnSpcReduction="2000"/>
-          </a:bodyPr>
-          <a:lstStyle/>
-          <a:p>
-            <a:pPr>
-              <a:defRPr/>
-            </a:pPr>
-            <a:r>
-              <a:rPr lang="pl-PL" sz="3200" b="0" i="0" u="sng" strike="noStrike" cap="none" spc="0">
-                <a:solidFill>
-                  <a:schemeClr val="accent6">
-                    <a:lumMod val="50000"/>
-                  </a:schemeClr>
-                </a:solidFill>
-                <a:latin typeface="Arial"/>
-                <a:ea typeface="Arial"/>
-                <a:cs typeface="Arial"/>
-                <a:hlinkClick r:id="rId3" tooltip="https://zapier.com/blog/python-automation/"/>
+          <a:bodyPr/>
+          <a:lstStyle/>
+          <a:p>
+            <a:pPr>
+              <a:defRPr/>
+            </a:pPr>
+            <a:r>
+              <a:rPr/>
+              <a:t>Pyplot zachowuje swój stan między wywołaniami</a:t>
+            </a:r>
+            <a:endParaRPr/>
+          </a:p>
+          <a:p>
+            <a:pPr>
+              <a:defRPr/>
+            </a:pPr>
+            <a:r>
+              <a:rPr/>
+              <a:t>Mamy jeden wykres „w pamięci”, który modyfikujemy każdą kolejną wywołaną funkcją </a:t>
+            </a:r>
+            <a:endParaRPr/>
+          </a:p>
+          <a:p>
+            <a:pPr>
+              <a:defRPr/>
+            </a:pPr>
+            <a:r>
+              <a:rPr>
+                <a:latin typeface="Nimbus Mono PS"/>
+                <a:ea typeface="Nimbus Mono PS"/>
+                <a:cs typeface="Nimbus Mono PS"/>
               </a:rPr>
-              <a:t>https://zapier.com/blog/python-automation/</a:t>
-            </a:r>
-            <a:r>
-              <a:rPr/>
-              <a:t> (!!!!!!!!!)</a:t>
-            </a:r>
-            <a:endParaRPr/>
-          </a:p>
-          <a:p>
-            <a:pPr>
-              <a:defRPr/>
-            </a:pPr>
-            <a:r>
-              <a:rPr lang="pl-PL" sz="3200" b="0" i="0" u="sng" strike="noStrike" cap="none" spc="0">
-                <a:solidFill>
-                  <a:schemeClr val="accent6">
-                    <a:lumMod val="50000"/>
-                  </a:schemeClr>
-                </a:solidFill>
-                <a:latin typeface="Arial"/>
-                <a:ea typeface="Arial"/>
-                <a:cs typeface="Arial"/>
-                <a:hlinkClick r:id="rId4" tooltip="https://docs.python.org/3/"/>
+              <a:t>plt.show</a:t>
+            </a:r>
+            <a:r>
+              <a:rPr/>
+              <a:t> wyświetla zapamiętany wykres</a:t>
+            </a:r>
+            <a:endParaRPr/>
+          </a:p>
+          <a:p>
+            <a:pPr>
+              <a:defRPr/>
+            </a:pPr>
+            <a:r>
+              <a:rPr/>
+              <a:t>Utworzenie nowego wykresu sprawi, że Pyplot zapomni o poprzednim</a:t>
+            </a:r>
+            <a:endParaRPr/>
+          </a:p>
+        </p:txBody>
+      </p:sp>
+    </p:spTree>
+  </p:cSld>
+  <p:clrMapOvr>
+    <a:masterClrMapping/>
+  </p:clrMapOvr>
+  <mc:AlternateContent xmlns:mc="http://schemas.openxmlformats.org/markup-compatibility/2006">
+    <mc:Choice xmlns:p159="http://schemas.microsoft.com/office/powerpoint/2015/09/main" xmlns:p14="http://schemas.microsoft.com/office/powerpoint/2010/main" Requires="p159">
+      <p:transition p14:dur="2000" advClick="1"/>
+    </mc:Choice>
+    <mc:Fallback>
+      <p:transition advClick="1"/>
+    </mc:Fallback>
+  </mc:AlternateContent>
+</p:sld>
+</file>
+
+<file path=ppt/slides/slide18.xml><?xml version="1.0" encoding="utf-8"?>
+<p:sld xmlns:a="http://schemas.openxmlformats.org/drawingml/2006/main" xmlns:r="http://schemas.openxmlformats.org/officeDocument/2006/relationships" xmlns:p="http://schemas.openxmlformats.org/presentationml/2006/main" xmlns:m="http://schemas.openxmlformats.org/officeDocument/2006/math" xmlns:w="http://schemas.openxmlformats.org/wordprocessingml/2006/main" showMasterPhAnim="0" show="1">
+  <p:cSld name="">
+    <p:spTree>
+      <p:nvGrpSpPr>
+        <p:cNvPr id="1" name=""/>
+        <p:cNvGrpSpPr/>
+        <p:nvPr/>
+      </p:nvGrpSpPr>
+      <p:grpSpPr bwMode="auto">
+        <a:xfrm>
+          <a:off x="0" y="0"/>
+          <a:ext cx="0" cy="0"/>
+          <a:chOff x="0" y="0"/>
+          <a:chExt cx="0" cy="0"/>
+        </a:xfrm>
+      </p:grpSpPr>
+      <p:sp>
+        <p:nvSpPr>
+          <p:cNvPr id="1875844484" name="Заголовок 1"/>
+          <p:cNvSpPr>
+            <a:spLocks noGrp="1"/>
+          </p:cNvSpPr>
+          <p:nvPr>
+            <p:ph type="title"/>
+          </p:nvPr>
+        </p:nvSpPr>
+        <p:spPr bwMode="auto"/>
+        <p:txBody>
+          <a:bodyPr/>
+          <a:lstStyle/>
+          <a:p>
+            <a:pPr>
+              <a:defRPr/>
+            </a:pPr>
+            <a:r>
+              <a:rPr/>
+              <a:t>Zadania – Wykres Sinusa</a:t>
+            </a:r>
+            <a:endParaRPr/>
+          </a:p>
+        </p:txBody>
+      </p:sp>
+      <p:sp>
+        <p:nvSpPr>
+          <p:cNvPr id="379364510" name="Объект 2"/>
+          <p:cNvSpPr>
+            <a:spLocks noGrp="1"/>
+          </p:cNvSpPr>
+          <p:nvPr>
+            <p:ph idx="1"/>
+          </p:nvPr>
+        </p:nvSpPr>
+        <p:spPr bwMode="auto"/>
+        <p:txBody>
+          <a:bodyPr/>
+          <a:lstStyle/>
+          <a:p>
+            <a:pPr>
+              <a:defRPr/>
+            </a:pPr>
+            <a:r>
+              <a:rPr/>
+              <a:t>Na Githubie znajdziesz plik „sinus_data.csv”, który zawiera współrzędne punktów wykresu funkcji sinus.</a:t>
+            </a:r>
+            <a:endParaRPr/>
+          </a:p>
+          <a:p>
+            <a:pPr>
+              <a:defRPr/>
+            </a:pPr>
+            <a:r>
+              <a:rPr/>
+              <a:t>Pierwszy wiersz zawiera wartości osi x, zaś drugi wartości osi y. Liczby są oddzielone średnikami.</a:t>
+            </a:r>
+            <a:endParaRPr/>
+          </a:p>
+          <a:p>
+            <a:pPr>
+              <a:defRPr/>
+            </a:pPr>
+            <a:r>
+              <a:rPr/>
+              <a:t>Należy narysować wykres tej funkcji</a:t>
+            </a:r>
+            <a:endParaRPr/>
+          </a:p>
+          <a:p>
+            <a:pPr>
+              <a:defRPr/>
+            </a:pPr>
+            <a:r>
+              <a:rPr/>
+              <a:t>Bonusowe punkty za dodanie etykiet osi i wyświetlenie funkcji tylko dla x </a:t>
+            </a:r>
+            <a:r>
+              <a:rPr>
+                <a:latin typeface="Asana"/>
+                <a:ea typeface="Asana"/>
+                <a:cs typeface="Asana"/>
               </a:rPr>
-              <a:t>https://docs.python.org/3</a:t>
-            </a:r>
-            <a:r>
-              <a:rPr lang="pl-PL" sz="3200" b="0" i="0" u="sng" strike="noStrike" cap="none" spc="0">
-                <a:solidFill>
-                  <a:schemeClr val="accent6">
-                    <a:lumMod val="50000"/>
-                  </a:schemeClr>
-                </a:solidFill>
-                <a:latin typeface="Arial"/>
-                <a:ea typeface="Arial"/>
-                <a:cs typeface="Arial"/>
-                <a:hlinkClick r:id="rId4" tooltip="https://docs.python.org/3/"/>
-              </a:rPr>
-              <a:t>/</a:t>
-            </a:r>
-            <a:endParaRPr/>
-          </a:p>
-          <a:p>
-            <a:pPr>
-              <a:defRPr/>
-            </a:pPr>
-            <a:r>
-              <a:rPr lang="pl-PL" sz="3200" b="0" i="0" u="sng" strike="noStrike" cap="none" spc="0">
-                <a:solidFill>
-                  <a:schemeClr val="accent6">
-                    <a:lumMod val="50000"/>
-                  </a:schemeClr>
-                </a:solidFill>
-                <a:latin typeface="Arial"/>
-                <a:ea typeface="Arial"/>
-                <a:cs typeface="Arial"/>
-                <a:hlinkClick r:id="rId5" tooltip="https://stackoverflow.com/questions/1466000/difference-between-modes-a-a-w-w-and-r-in-built-in-open-function"/>
-              </a:rPr>
-              <a:t>https://stackoverflow.com/questions/1466000/difference-between-modes-a-a-w-w-and-r-in-built-in-open-function</a:t>
-            </a:r>
-            <a:endParaRPr lang="pl-PL" sz="3200" b="0" i="0" u="none" strike="noStrike" cap="none" spc="0">
-              <a:solidFill>
-                <a:schemeClr val="accent6">
-                  <a:lumMod val="50000"/>
-                </a:schemeClr>
-              </a:solidFill>
-              <a:latin typeface="Arial"/>
-              <a:ea typeface="Arial"/>
-              <a:cs typeface="Arial"/>
-            </a:endParaRPr>
-          </a:p>
-          <a:p>
-            <a:pPr>
-              <a:defRPr/>
-            </a:pPr>
-            <a:r>
-              <a:rPr lang="pl-PL" sz="3200" b="0" i="0" u="sng" strike="noStrike" cap="none" spc="0">
-                <a:solidFill>
-                  <a:schemeClr val="accent6">
-                    <a:lumMod val="50000"/>
-                  </a:schemeClr>
-                </a:solidFill>
-                <a:latin typeface="Arial"/>
-                <a:ea typeface="Arial"/>
-                <a:cs typeface="Arial"/>
-                <a:hlinkClick r:id="rId6" tooltip="http://www.geeksforgeeks.org"/>
-              </a:rPr>
-              <a:t>www.geeksforgeeks.org</a:t>
-            </a:r>
-            <a:endParaRPr lang="pl-PL" sz="3200" b="0" i="0" u="none" strike="noStrike" cap="none" spc="0">
-              <a:solidFill>
-                <a:schemeClr val="accent6">
-                  <a:lumMod val="50000"/>
-                </a:schemeClr>
-              </a:solidFill>
-              <a:latin typeface="Arial"/>
-              <a:ea typeface="Arial"/>
-              <a:cs typeface="Arial"/>
-            </a:endParaRPr>
-          </a:p>
-          <a:p>
-            <a:pPr>
-              <a:defRPr/>
-            </a:pPr>
-            <a:r>
-              <a:rPr lang="pl-PL" sz="3200" b="0" i="0" u="sng" strike="noStrike" cap="none" spc="0">
-                <a:solidFill>
-                  <a:schemeClr val="accent6">
-                    <a:lumMod val="50000"/>
-                  </a:schemeClr>
-                </a:solidFill>
-                <a:latin typeface="Arial"/>
-                <a:ea typeface="Arial"/>
-                <a:cs typeface="Arial"/>
-                <a:hlinkClick r:id="rId7" tooltip="https://www.w3schools.com/"/>
-              </a:rPr>
-              <a:t>https://www.w3schools.com/</a:t>
-            </a:r>
-            <a:endParaRPr lang="pl-PL" sz="3200" b="0" i="0" u="none" strike="noStrike" cap="none" spc="0">
-              <a:solidFill>
-                <a:schemeClr val="accent6">
-                  <a:lumMod val="50000"/>
-                </a:schemeClr>
-              </a:solidFill>
-              <a:latin typeface="Arial"/>
-              <a:ea typeface="Arial"/>
-              <a:cs typeface="Arial"/>
-            </a:endParaRPr>
-          </a:p>
-          <a:p>
-            <a:pPr>
-              <a:defRPr/>
-            </a:pPr>
-            <a:r>
-              <a:rPr lang="pl-PL" sz="3200" b="0" i="0" u="sng" strike="noStrike" cap="none" spc="0">
-                <a:solidFill>
-                  <a:schemeClr val="accent6">
-                    <a:lumMod val="50000"/>
-                  </a:schemeClr>
-                </a:solidFill>
-                <a:latin typeface="Arial"/>
-                <a:ea typeface="Arial"/>
-                <a:cs typeface="Arial"/>
-                <a:hlinkClick r:id="rId8" tooltip="https://shotkit.com/free-raw-photos/"/>
-              </a:rPr>
-              <a:t>https://shotkit.com/free-raw-photos/</a:t>
-            </a:r>
-            <a:endParaRPr lang="pl-PL" sz="3200" b="0" i="0" u="none" strike="noStrike" cap="none" spc="0">
-              <a:solidFill>
-                <a:schemeClr val="accent6">
-                  <a:lumMod val="50000"/>
-                </a:schemeClr>
-              </a:solidFill>
-              <a:latin typeface="Arial"/>
-              <a:ea typeface="Arial"/>
-              <a:cs typeface="Arial"/>
-            </a:endParaRPr>
-          </a:p>
-          <a:p>
-            <a:pPr>
-              <a:defRPr/>
-            </a:pPr>
-            <a:r>
-              <a:rPr lang="pl-PL" sz="3200" b="0" i="0" u="none" strike="noStrike" cap="none" spc="0">
-                <a:solidFill>
-                  <a:schemeClr val="accent6">
-                    <a:lumMod val="50000"/>
-                  </a:schemeClr>
-                </a:solidFill>
+              <a:t>∊&lt;</a:t>
+            </a:r>
+            <a:r>
+              <a:rPr>
                 <a:latin typeface="Arial"/>
                 <a:ea typeface="Arial"/>
                 <a:cs typeface="Arial"/>
               </a:rPr>
-              <a:t>https://stackoverflow.com/questions/2547349/what-does-x-mean-in-c-c</a:t>
-            </a:r>
-            <a:endParaRPr lang="pl-PL"/>
-          </a:p>
-          <a:p>
-            <a:pPr>
-              <a:defRPr/>
-            </a:pPr>
+              <a:t>π</a:t>
+            </a:r>
+            <a:r>
+              <a:rPr>
+                <a:latin typeface="Asana"/>
+                <a:ea typeface="Asana"/>
+                <a:cs typeface="Asana"/>
+              </a:rPr>
+              <a:t>,2</a:t>
+            </a:r>
+            <a:r>
+              <a:rPr>
+                <a:latin typeface="Arial"/>
+                <a:ea typeface="Arial"/>
+                <a:cs typeface="Arial"/>
+              </a:rPr>
+              <a:t>π</a:t>
+            </a:r>
+            <a:r>
+              <a:rPr>
+                <a:latin typeface="Asana"/>
+                <a:ea typeface="Asana"/>
+                <a:cs typeface="Asana"/>
+              </a:rPr>
+              <a:t>&gt;</a:t>
+            </a:r>
+            <a:endParaRPr/>
+          </a:p>
+        </p:txBody>
+      </p:sp>
+      <p:sp>
+        <p:nvSpPr>
+          <p:cNvPr id="1753727761" name=""/>
+          <p:cNvSpPr txBox="1"/>
+          <p:nvPr/>
+        </p:nvSpPr>
+        <p:spPr bwMode="auto">
+          <a:xfrm flipH="0" flipV="0">
+            <a:off x="7926741" y="6126163"/>
+            <a:ext cx="3853593" cy="366120"/>
+          </a:xfrm>
+          <a:prstGeom prst="rect">
+            <a:avLst/>
+          </a:prstGeom>
+          <a:noFill/>
+        </p:spPr>
+        <p:txBody>
+          <a:bodyPr vertOverflow="overflow" horzOverflow="overflow" vert="horz" wrap="square" lIns="91440" tIns="45720" rIns="91440" bIns="45720" numCol="1" spcCol="0" rtlCol="0" fromWordArt="0" anchor="t" anchorCtr="0" forceAA="0" upright="0" compatLnSpc="0">
+            <a:spAutoFit/>
+          </a:bodyPr>
+          <a:p>
+            <a:pPr>
+              <a:defRPr/>
+            </a:pPr>
+            <a:r>
+              <a:rPr>
+                <a:latin typeface="Source Code Pro ExtraLight"/>
+                <a:ea typeface="Source Code Pro ExtraLight"/>
+                <a:cs typeface="Source Code Pro ExtraLight"/>
+              </a:rPr>
+              <a:t>text_operations.py</a:t>
+            </a:r>
+            <a:endParaRPr/>
+          </a:p>
+        </p:txBody>
+      </p:sp>
+    </p:spTree>
+  </p:cSld>
+  <p:clrMapOvr>
+    <a:masterClrMapping/>
+  </p:clrMapOvr>
+  <mc:AlternateContent xmlns:mc="http://schemas.openxmlformats.org/markup-compatibility/2006">
+    <mc:Choice xmlns:p159="http://schemas.microsoft.com/office/powerpoint/2015/09/main" xmlns:p14="http://schemas.microsoft.com/office/powerpoint/2010/main" Requires="p159">
+      <p:transition p14:dur="2000" advClick="1"/>
+    </mc:Choice>
+    <mc:Fallback>
+      <p:transition advClick="1"/>
+    </mc:Fallback>
+  </mc:AlternateContent>
+</p:sld>
+</file>
+
+<file path=ppt/slides/slide19.xml><?xml version="1.0" encoding="utf-8"?>
+<p:sld xmlns:a="http://schemas.openxmlformats.org/drawingml/2006/main" xmlns:r="http://schemas.openxmlformats.org/officeDocument/2006/relationships" xmlns:p="http://schemas.openxmlformats.org/presentationml/2006/main" xmlns:m="http://schemas.openxmlformats.org/officeDocument/2006/math" xmlns:w="http://schemas.openxmlformats.org/wordprocessingml/2006/main" showMasterPhAnim="0" show="1">
+  <p:cSld name="">
+    <p:spTree>
+      <p:nvGrpSpPr>
+        <p:cNvPr id="1" name=""/>
+        <p:cNvGrpSpPr/>
+        <p:nvPr/>
+      </p:nvGrpSpPr>
+      <p:grpSpPr bwMode="auto">
+        <a:xfrm>
+          <a:off x="0" y="0"/>
+          <a:ext cx="0" cy="0"/>
+          <a:chOff x="0" y="0"/>
+          <a:chExt cx="0" cy="0"/>
+        </a:xfrm>
+      </p:grpSpPr>
+      <p:sp>
+        <p:nvSpPr>
+          <p:cNvPr id="749076809" name="Заголовок 1"/>
+          <p:cNvSpPr>
+            <a:spLocks noGrp="1"/>
+          </p:cNvSpPr>
+          <p:nvPr>
+            <p:ph type="title"/>
+          </p:nvPr>
+        </p:nvSpPr>
+        <p:spPr bwMode="auto"/>
+        <p:txBody>
+          <a:bodyPr/>
+          <a:lstStyle/>
+          <a:p>
+            <a:pPr>
+              <a:defRPr/>
+            </a:pPr>
+            <a:r>
+              <a:rPr/>
+              <a:t>Zadanie - Litery</a:t>
+            </a:r>
+            <a:endParaRPr/>
+          </a:p>
+        </p:txBody>
+      </p:sp>
+      <p:sp>
+        <p:nvSpPr>
+          <p:cNvPr id="980496072" name="Объект 2"/>
+          <p:cNvSpPr>
+            <a:spLocks noGrp="1"/>
+          </p:cNvSpPr>
+          <p:nvPr>
+            <p:ph idx="1"/>
+          </p:nvPr>
+        </p:nvSpPr>
+        <p:spPr bwMode="auto"/>
+        <p:txBody>
+          <a:bodyPr/>
+          <a:lstStyle/>
+          <a:p>
+            <a:pPr>
+              <a:defRPr/>
+            </a:pPr>
+            <a:r>
+              <a:rPr/>
+              <a:t>Plik „abc_data.csv” zawiera ciąg liter ‘a’, ‘b’ i ‘c’ oddzielonych średnikami.</a:t>
+            </a:r>
+            <a:endParaRPr/>
+          </a:p>
+          <a:p>
+            <a:pPr>
+              <a:defRPr/>
+            </a:pPr>
+            <a:r>
+              <a:rPr/>
+              <a:t>Należy stworzyć historgram przedstawiający liczbę wystąpień każdej litery</a:t>
+            </a:r>
+            <a:endParaRPr/>
+          </a:p>
+          <a:p>
+            <a:pPr>
+              <a:defRPr/>
+            </a:pPr>
+            <a:r>
+              <a:rPr/>
+              <a:t>Następnie należy stworzyć analogiczny wykres kołowy opatrzony odpowiednimi etykietami.</a:t>
+            </a:r>
+            <a:endParaRPr/>
+          </a:p>
+          <a:p>
+            <a:pPr>
+              <a:defRPr/>
+            </a:pPr>
+            <a:r>
+              <a:rPr/>
+              <a:t>Uwaga – histogram jest „sprytny” i wystarczy podać mu tablicę liter + liczbę „koszyków”. Dla wykresu kołowego trzeba je najpierw policzyć. </a:t>
+            </a:r>
+            <a:endParaRPr/>
+          </a:p>
+        </p:txBody>
+      </p:sp>
+      <p:sp>
+        <p:nvSpPr>
+          <p:cNvPr id="710090957" name=""/>
+          <p:cNvSpPr txBox="1"/>
+          <p:nvPr/>
+        </p:nvSpPr>
+        <p:spPr bwMode="auto">
+          <a:xfrm flipH="0" flipV="0">
+            <a:off x="7926741" y="6126163"/>
+            <a:ext cx="3858633" cy="366120"/>
+          </a:xfrm>
+          <a:prstGeom prst="rect">
+            <a:avLst/>
+          </a:prstGeom>
+          <a:noFill/>
+        </p:spPr>
+        <p:txBody>
+          <a:bodyPr vertOverflow="overflow" horzOverflow="overflow" vert="horz" wrap="square" lIns="91440" tIns="45720" rIns="91440" bIns="45720" numCol="1" spcCol="0" rtlCol="0" fromWordArt="0" anchor="t" anchorCtr="0" forceAA="0" upright="0" compatLnSpc="0">
+            <a:spAutoFit/>
+          </a:bodyPr>
+          <a:p>
+            <a:pPr>
+              <a:defRPr/>
+            </a:pPr>
+            <a:r>
+              <a:rPr>
+                <a:latin typeface="Source Code Pro ExtraLight"/>
+                <a:ea typeface="Source Code Pro ExtraLight"/>
+                <a:cs typeface="Source Code Pro ExtraLight"/>
+              </a:rPr>
+              <a:t>letters.py</a:t>
+            </a:r>
             <a:endParaRPr/>
           </a:p>
         </p:txBody>
@@ -9445,6 +10090,458 @@
               <a:rPr/>
               <a:t>Nudne, powtarzalne zadania</a:t>
             </a:r>
+            <a:endParaRPr/>
+          </a:p>
+        </p:txBody>
+      </p:sp>
+    </p:spTree>
+  </p:cSld>
+  <p:clrMapOvr>
+    <a:masterClrMapping/>
+  </p:clrMapOvr>
+  <mc:AlternateContent xmlns:mc="http://schemas.openxmlformats.org/markup-compatibility/2006">
+    <mc:Choice xmlns:p159="http://schemas.microsoft.com/office/powerpoint/2015/09/main" xmlns:p14="http://schemas.microsoft.com/office/powerpoint/2010/main" Requires="p159">
+      <p:transition p14:dur="2000" advClick="1"/>
+    </mc:Choice>
+    <mc:Fallback>
+      <p:transition advClick="1"/>
+    </mc:Fallback>
+  </mc:AlternateContent>
+</p:sld>
+</file>
+
+<file path=ppt/slides/slide20.xml><?xml version="1.0" encoding="utf-8"?>
+<p:sld xmlns:a="http://schemas.openxmlformats.org/drawingml/2006/main" xmlns:r="http://schemas.openxmlformats.org/officeDocument/2006/relationships" xmlns:p="http://schemas.openxmlformats.org/presentationml/2006/main" xmlns:m="http://schemas.openxmlformats.org/officeDocument/2006/math" xmlns:w="http://schemas.openxmlformats.org/wordprocessingml/2006/main" showMasterPhAnim="0" show="1">
+  <p:cSld name="">
+    <p:spTree>
+      <p:nvGrpSpPr>
+        <p:cNvPr id="1" name=""/>
+        <p:cNvGrpSpPr/>
+        <p:nvPr/>
+      </p:nvGrpSpPr>
+      <p:grpSpPr bwMode="auto">
+        <a:xfrm>
+          <a:off x="0" y="0"/>
+          <a:ext cx="0" cy="0"/>
+          <a:chOff x="0" y="0"/>
+          <a:chExt cx="0" cy="0"/>
+        </a:xfrm>
+      </p:grpSpPr>
+      <p:sp>
+        <p:nvSpPr>
+          <p:cNvPr id="804937722" name="Заголовок 1"/>
+          <p:cNvSpPr>
+            <a:spLocks noGrp="1"/>
+          </p:cNvSpPr>
+          <p:nvPr>
+            <p:ph type="title"/>
+          </p:nvPr>
+        </p:nvSpPr>
+        <p:spPr bwMode="auto"/>
+        <p:txBody>
+          <a:bodyPr/>
+          <a:lstStyle/>
+          <a:p>
+            <a:pPr>
+              <a:defRPr/>
+            </a:pPr>
+            <a:r>
+              <a:rPr/>
+              <a:t>Zadanie – rozkład standardowy</a:t>
+            </a:r>
+            <a:endParaRPr/>
+          </a:p>
+        </p:txBody>
+      </p:sp>
+      <p:sp>
+        <p:nvSpPr>
+          <p:cNvPr id="106648084" name="Объект 2"/>
+          <p:cNvSpPr>
+            <a:spLocks noGrp="1"/>
+          </p:cNvSpPr>
+          <p:nvPr>
+            <p:ph idx="1"/>
+          </p:nvPr>
+        </p:nvSpPr>
+        <p:spPr bwMode="auto"/>
+        <p:txBody>
+          <a:bodyPr/>
+          <a:lstStyle/>
+          <a:p>
+            <a:pPr>
+              <a:defRPr/>
+            </a:pPr>
+            <a:r>
+              <a:rPr/>
+              <a:t>Należy stworzyć kolejny histogram, tym razem przedstawiający rozkład standardowy</a:t>
+            </a:r>
+            <a:endParaRPr/>
+          </a:p>
+          <a:p>
+            <a:pPr>
+              <a:defRPr/>
+            </a:pPr>
+            <a:r>
+              <a:rPr/>
+              <a:t>Można go stworzyć przy pomocy </a:t>
+            </a:r>
+            <a:r>
+              <a:rPr sz="2600" b="0" i="0" u="none">
+                <a:solidFill>
+                  <a:schemeClr val="tx1"/>
+                </a:solidFill>
+                <a:latin typeface="Nimbus Mono PS"/>
+                <a:ea typeface="Nimbus Mono PS"/>
+                <a:cs typeface="Nimbus Mono PS"/>
+              </a:rPr>
+              <a:t>np.random.standard_normal(</a:t>
+            </a:r>
+            <a:r>
+              <a:rPr sz="2600" b="0" i="0" u="none">
+                <a:solidFill>
+                  <a:schemeClr val="tx1"/>
+                </a:solidFill>
+                <a:latin typeface="Nimbus Mono PS"/>
+                <a:ea typeface="Nimbus Mono PS"/>
+                <a:cs typeface="Nimbus Mono PS"/>
+              </a:rPr>
+              <a:t>10000</a:t>
+            </a:r>
+            <a:r>
+              <a:rPr sz="2600" b="0" i="0" u="none">
+                <a:solidFill>
+                  <a:schemeClr val="tx1"/>
+                </a:solidFill>
+                <a:latin typeface="Nimbus Mono PS"/>
+                <a:ea typeface="Nimbus Mono PS"/>
+                <a:cs typeface="Nimbus Mono PS"/>
+              </a:rPr>
+              <a:t>)</a:t>
+            </a:r>
+            <a:r>
+              <a:rPr lang="pl-PL" sz="2600" b="0" i="0" u="none" strike="noStrike" cap="none" spc="0">
+                <a:solidFill>
+                  <a:schemeClr val="accent6">
+                    <a:lumMod val="50000"/>
+                  </a:schemeClr>
+                </a:solidFill>
+                <a:latin typeface="+mn-lt"/>
+                <a:ea typeface="+mn-ea"/>
+                <a:cs typeface="+mn-cs"/>
+              </a:rPr>
+              <a:t>z biblioteki numpy</a:t>
+            </a:r>
+            <a:endParaRPr lang="pl-PL" sz="2600" b="0" i="0" u="none" strike="noStrike" cap="none" spc="0">
+              <a:solidFill>
+                <a:schemeClr val="accent6">
+                  <a:lumMod val="50000"/>
+                </a:schemeClr>
+              </a:solidFill>
+              <a:latin typeface="Times New Roman"/>
+              <a:cs typeface="Times New Roman"/>
+            </a:endParaRPr>
+          </a:p>
+          <a:p>
+            <a:pPr>
+              <a:defRPr/>
+            </a:pPr>
+            <a:r>
+              <a:rPr lang="pl-PL" sz="3200" b="0" i="0" u="none" strike="noStrike" cap="none" spc="0">
+                <a:solidFill>
+                  <a:schemeClr val="accent6">
+                    <a:lumMod val="50000"/>
+                  </a:schemeClr>
+                </a:solidFill>
+                <a:latin typeface="Arial"/>
+                <a:ea typeface="Arial"/>
+                <a:cs typeface="Arial"/>
+              </a:rPr>
+              <a:t>Sprawdź co się stanie, kiedy zmienisz liczbę „kubełków”</a:t>
+            </a:r>
+            <a:endParaRPr lang="pl-PL" sz="2600" b="0" i="0" u="none" strike="noStrike" cap="none" spc="0">
+              <a:solidFill>
+                <a:schemeClr val="accent6">
+                  <a:lumMod val="50000"/>
+                </a:schemeClr>
+              </a:solidFill>
+              <a:latin typeface="Times New Roman"/>
+              <a:cs typeface="Times New Roman"/>
+            </a:endParaRPr>
+          </a:p>
+        </p:txBody>
+      </p:sp>
+    </p:spTree>
+  </p:cSld>
+  <p:clrMapOvr>
+    <a:masterClrMapping/>
+  </p:clrMapOvr>
+  <mc:AlternateContent xmlns:mc="http://schemas.openxmlformats.org/markup-compatibility/2006">
+    <mc:Choice xmlns:p159="http://schemas.microsoft.com/office/powerpoint/2015/09/main" xmlns:p14="http://schemas.microsoft.com/office/powerpoint/2010/main" Requires="p159">
+      <p:transition p14:dur="2000" advClick="1"/>
+    </mc:Choice>
+    <mc:Fallback>
+      <p:transition advClick="1"/>
+    </mc:Fallback>
+  </mc:AlternateContent>
+</p:sld>
+</file>
+
+<file path=ppt/slides/slide21.xml><?xml version="1.0" encoding="utf-8"?>
+<p:sld xmlns:a="http://schemas.openxmlformats.org/drawingml/2006/main" xmlns:r="http://schemas.openxmlformats.org/officeDocument/2006/relationships" xmlns:p="http://schemas.openxmlformats.org/presentationml/2006/main" xmlns:m="http://schemas.openxmlformats.org/officeDocument/2006/math" xmlns:w="http://schemas.openxmlformats.org/wordprocessingml/2006/main" showMasterPhAnim="0" show="1">
+  <p:cSld name="">
+    <p:spTree>
+      <p:nvGrpSpPr>
+        <p:cNvPr id="1" name=""/>
+        <p:cNvGrpSpPr/>
+        <p:nvPr/>
+      </p:nvGrpSpPr>
+      <p:grpSpPr bwMode="auto">
+        <a:xfrm>
+          <a:off x="0" y="0"/>
+          <a:ext cx="0" cy="0"/>
+          <a:chOff x="0" y="0"/>
+          <a:chExt cx="0" cy="0"/>
+        </a:xfrm>
+      </p:grpSpPr>
+      <p:sp>
+        <p:nvSpPr>
+          <p:cNvPr id="1432733166" name="Заголовок 1"/>
+          <p:cNvSpPr>
+            <a:spLocks noGrp="1"/>
+          </p:cNvSpPr>
+          <p:nvPr>
+            <p:ph type="title"/>
+          </p:nvPr>
+        </p:nvSpPr>
+        <p:spPr bwMode="auto"/>
+        <p:txBody>
+          <a:bodyPr/>
+          <a:lstStyle/>
+          <a:p>
+            <a:pPr>
+              <a:defRPr/>
+            </a:pPr>
+            <a:r>
+              <a:rPr/>
+              <a:t>Źródła</a:t>
+            </a:r>
+            <a:endParaRPr/>
+          </a:p>
+        </p:txBody>
+      </p:sp>
+      <p:sp>
+        <p:nvSpPr>
+          <p:cNvPr id="1720179705" name="Объект 2"/>
+          <p:cNvSpPr>
+            <a:spLocks noGrp="1"/>
+          </p:cNvSpPr>
+          <p:nvPr>
+            <p:ph idx="1"/>
+          </p:nvPr>
+        </p:nvSpPr>
+        <p:spPr bwMode="auto"/>
+        <p:txBody>
+          <a:bodyPr vertOverflow="overflow" horzOverflow="overflow" vert="horz" wrap="square" lIns="91440" tIns="45720" rIns="91440" bIns="45720" numCol="1" spcCol="0" rtlCol="0" fromWordArt="0" anchor="t" anchorCtr="0" forceAA="0" upright="0" compatLnSpc="0">
+            <a:normAutofit fontScale="90000" lnSpcReduction="2000"/>
+          </a:bodyPr>
+          <a:lstStyle/>
+          <a:p>
+            <a:pPr>
+              <a:defRPr/>
+            </a:pPr>
+            <a:r>
+              <a:rPr lang="pl-PL" sz="3200" b="0" i="0" u="sng" strike="noStrike" cap="none" spc="0">
+                <a:solidFill>
+                  <a:schemeClr val="accent6">
+                    <a:lumMod val="50000"/>
+                  </a:schemeClr>
+                </a:solidFill>
+                <a:latin typeface="Arial"/>
+                <a:ea typeface="Arial"/>
+                <a:cs typeface="Arial"/>
+                <a:hlinkClick r:id="rId3" tooltip="https://zapier.com/blog/python-automation/"/>
+              </a:rPr>
+              <a:t>https://zapier.com/blog/python-automation/</a:t>
+            </a:r>
+            <a:r>
+              <a:rPr/>
+              <a:t> (!!!!!!!!!)</a:t>
+            </a:r>
+            <a:endParaRPr/>
+          </a:p>
+          <a:p>
+            <a:pPr>
+              <a:defRPr/>
+            </a:pPr>
+            <a:r>
+              <a:rPr lang="pl-PL" sz="3200" b="0" i="0" u="sng" strike="noStrike" cap="none" spc="0">
+                <a:solidFill>
+                  <a:schemeClr val="accent6">
+                    <a:lumMod val="50000"/>
+                  </a:schemeClr>
+                </a:solidFill>
+                <a:latin typeface="Arial"/>
+                <a:ea typeface="Arial"/>
+                <a:cs typeface="Arial"/>
+                <a:hlinkClick r:id="rId4" tooltip="https://docs.python.org/3/"/>
+              </a:rPr>
+              <a:t>https://docs.python.org/3</a:t>
+            </a:r>
+            <a:r>
+              <a:rPr lang="pl-PL" sz="3200" b="0" i="0" u="sng" strike="noStrike" cap="none" spc="0">
+                <a:solidFill>
+                  <a:schemeClr val="accent6">
+                    <a:lumMod val="50000"/>
+                  </a:schemeClr>
+                </a:solidFill>
+                <a:latin typeface="Arial"/>
+                <a:ea typeface="Arial"/>
+                <a:cs typeface="Arial"/>
+                <a:hlinkClick r:id="rId4" tooltip="https://docs.python.org/3/"/>
+              </a:rPr>
+              <a:t>/</a:t>
+            </a:r>
+            <a:endParaRPr/>
+          </a:p>
+          <a:p>
+            <a:pPr>
+              <a:defRPr/>
+            </a:pPr>
+            <a:r>
+              <a:rPr lang="pl-PL" sz="3200" b="0" i="0" u="sng" strike="noStrike" cap="none" spc="0">
+                <a:solidFill>
+                  <a:schemeClr val="accent6">
+                    <a:lumMod val="50000"/>
+                  </a:schemeClr>
+                </a:solidFill>
+                <a:latin typeface="Arial"/>
+                <a:ea typeface="Arial"/>
+                <a:cs typeface="Arial"/>
+                <a:hlinkClick r:id="rId5" tooltip="https://stackoverflow.com/questions/1466000/difference-between-modes-a-a-w-w-and-r-in-built-in-open-function"/>
+              </a:rPr>
+              <a:t>https://stackoverflow.com/questions/1466000/difference-between-modes-a-a-w-w-and-r-in-built-in-open-function</a:t>
+            </a:r>
+            <a:endParaRPr lang="pl-PL" sz="3200" b="0" i="0" u="none" strike="noStrike" cap="none" spc="0">
+              <a:solidFill>
+                <a:schemeClr val="accent6">
+                  <a:lumMod val="50000"/>
+                </a:schemeClr>
+              </a:solidFill>
+              <a:latin typeface="Arial"/>
+              <a:ea typeface="Arial"/>
+              <a:cs typeface="Arial"/>
+            </a:endParaRPr>
+          </a:p>
+          <a:p>
+            <a:pPr>
+              <a:defRPr/>
+            </a:pPr>
+            <a:r>
+              <a:rPr lang="pl-PL" sz="3200" b="0" i="0" u="sng" strike="noStrike" cap="none" spc="0">
+                <a:solidFill>
+                  <a:schemeClr val="accent6">
+                    <a:lumMod val="50000"/>
+                  </a:schemeClr>
+                </a:solidFill>
+                <a:latin typeface="Arial"/>
+                <a:ea typeface="Arial"/>
+                <a:cs typeface="Arial"/>
+                <a:hlinkClick r:id="rId6" tooltip="http://www.geeksforgeeks.org"/>
+              </a:rPr>
+              <a:t>www.geeksforgeeks.org</a:t>
+            </a:r>
+            <a:endParaRPr lang="pl-PL" sz="3200" b="0" i="0" u="none" strike="noStrike" cap="none" spc="0">
+              <a:solidFill>
+                <a:schemeClr val="accent6">
+                  <a:lumMod val="50000"/>
+                </a:schemeClr>
+              </a:solidFill>
+              <a:latin typeface="Arial"/>
+              <a:ea typeface="Arial"/>
+              <a:cs typeface="Arial"/>
+            </a:endParaRPr>
+          </a:p>
+          <a:p>
+            <a:pPr>
+              <a:defRPr/>
+            </a:pPr>
+            <a:r>
+              <a:rPr lang="pl-PL" sz="3200" b="0" i="0" u="sng" strike="noStrike" cap="none" spc="0">
+                <a:solidFill>
+                  <a:schemeClr val="accent6">
+                    <a:lumMod val="50000"/>
+                  </a:schemeClr>
+                </a:solidFill>
+                <a:latin typeface="Arial"/>
+                <a:ea typeface="Arial"/>
+                <a:cs typeface="Arial"/>
+                <a:hlinkClick r:id="rId7" tooltip="https://www.w3schools.com/"/>
+              </a:rPr>
+              <a:t>https://www.w3schools.com/</a:t>
+            </a:r>
+            <a:endParaRPr lang="pl-PL" sz="3200" b="0" i="0" u="none" strike="noStrike" cap="none" spc="0">
+              <a:solidFill>
+                <a:schemeClr val="accent6">
+                  <a:lumMod val="50000"/>
+                </a:schemeClr>
+              </a:solidFill>
+              <a:latin typeface="Arial"/>
+              <a:ea typeface="Arial"/>
+              <a:cs typeface="Arial"/>
+            </a:endParaRPr>
+          </a:p>
+          <a:p>
+            <a:pPr>
+              <a:defRPr/>
+            </a:pPr>
+            <a:r>
+              <a:rPr lang="pl-PL" sz="3200" b="0" i="0" u="sng" strike="noStrike" cap="none" spc="0">
+                <a:solidFill>
+                  <a:schemeClr val="accent6">
+                    <a:lumMod val="50000"/>
+                  </a:schemeClr>
+                </a:solidFill>
+                <a:latin typeface="Arial"/>
+                <a:ea typeface="Arial"/>
+                <a:cs typeface="Arial"/>
+                <a:hlinkClick r:id="rId8" tooltip="https://shotkit.com/free-raw-photos/"/>
+              </a:rPr>
+              <a:t>https://shotkit.com/free-raw-photos/</a:t>
+            </a:r>
+            <a:endParaRPr lang="pl-PL" sz="3200" b="0" i="0" u="none" strike="noStrike" cap="none" spc="0">
+              <a:solidFill>
+                <a:schemeClr val="accent6">
+                  <a:lumMod val="50000"/>
+                </a:schemeClr>
+              </a:solidFill>
+              <a:latin typeface="Arial"/>
+              <a:ea typeface="Arial"/>
+              <a:cs typeface="Arial"/>
+            </a:endParaRPr>
+          </a:p>
+          <a:p>
+            <a:pPr>
+              <a:defRPr/>
+            </a:pPr>
+            <a:r>
+              <a:rPr lang="pl-PL" sz="3200" b="0" i="0" u="none" strike="noStrike" cap="none" spc="0">
+                <a:solidFill>
+                  <a:schemeClr val="accent6">
+                    <a:lumMod val="50000"/>
+                  </a:schemeClr>
+                </a:solidFill>
+                <a:latin typeface="Arial"/>
+                <a:ea typeface="Arial"/>
+                <a:cs typeface="Arial"/>
+              </a:rPr>
+              <a:t>https://stackoverflow.com/questions/2547349/what-does-x-mean-in-c-c</a:t>
+            </a:r>
+            <a:endParaRPr lang="pl-PL"/>
+          </a:p>
+          <a:p>
+            <a:pPr>
+              <a:defRPr/>
+            </a:pPr>
             <a:endParaRPr/>
           </a:p>
         </p:txBody>
@@ -10187,7 +11284,7 @@
           <p:nvPr/>
         </p:nvSpPr>
         <p:spPr bwMode="auto">
-          <a:xfrm rot="10799990" flipH="0" flipV="0">
+          <a:xfrm rot="10799989" flipH="0" flipV="0">
             <a:off x="10276615" y="2876992"/>
             <a:ext cx="221510" cy="310115"/>
           </a:xfrm>

</xml_diff>